<commit_message>
Finished Slide maker and Created slide merger
</commit_message>
<xml_diff>
--- a/backend/powerpoint/templates/test_template1.pptx
+++ b/backend/powerpoint/templates/test_template1.pptx
@@ -5,7 +5,7 @@
     <p:sldMasterId id="2147483660" r:id="rId1"/>
   </p:sldMasterIdLst>
   <p:sldIdLst>
-    <p:sldId id="257" r:id="rId2"/>
+    <p:sldId id="258" r:id="rId2"/>
   </p:sldIdLst>
   <p:sldSz cx="12192000" cy="6858000"/>
   <p:notesSz cx="6858000" cy="9144000"/>
@@ -104,6 +104,11 @@
       </a:defRPr>
     </a:lvl9pPr>
   </p:defaultTextStyle>
+  <p:extLst>
+    <p:ext uri="{EFAFB233-063F-42B5-8137-9DF3F51BA10A}">
+      <p15:sldGuideLst xmlns:p15="http://schemas.microsoft.com/office/powerpoint/2012/main"/>
+    </p:ext>
+  </p:extLst>
 </p:presentation>
 </file>
 
@@ -293,7 +298,7 @@
           <a:p>
             <a:fld id="{1415355B-2634-4E66-91F0-41971C44CBA6}" type="datetimeFigureOut">
               <a:rPr lang="en-GB" smtClean="0"/>
-              <a:t>12/02/2025</a:t>
+              <a:t>13/02/2025</a:t>
             </a:fld>
             <a:endParaRPr lang="en-GB"/>
           </a:p>
@@ -568,7 +573,7 @@
           <a:p>
             <a:fld id="{1415355B-2634-4E66-91F0-41971C44CBA6}" type="datetimeFigureOut">
               <a:rPr lang="en-GB" smtClean="0"/>
-              <a:t>12/02/2025</a:t>
+              <a:t>13/02/2025</a:t>
             </a:fld>
             <a:endParaRPr lang="en-GB"/>
           </a:p>
@@ -762,7 +767,7 @@
           <a:p>
             <a:fld id="{1415355B-2634-4E66-91F0-41971C44CBA6}" type="datetimeFigureOut">
               <a:rPr lang="en-GB" smtClean="0"/>
-              <a:t>12/02/2025</a:t>
+              <a:t>13/02/2025</a:t>
             </a:fld>
             <a:endParaRPr lang="en-GB"/>
           </a:p>
@@ -1035,7 +1040,7 @@
           <a:p>
             <a:fld id="{1415355B-2634-4E66-91F0-41971C44CBA6}" type="datetimeFigureOut">
               <a:rPr lang="en-GB" smtClean="0"/>
-              <a:t>12/02/2025</a:t>
+              <a:t>13/02/2025</a:t>
             </a:fld>
             <a:endParaRPr lang="en-GB"/>
           </a:p>
@@ -1376,7 +1381,7 @@
           <a:p>
             <a:fld id="{1415355B-2634-4E66-91F0-41971C44CBA6}" type="datetimeFigureOut">
               <a:rPr lang="en-GB" smtClean="0"/>
-              <a:t>12/02/2025</a:t>
+              <a:t>13/02/2025</a:t>
             </a:fld>
             <a:endParaRPr lang="en-GB"/>
           </a:p>
@@ -1999,7 +2004,7 @@
           <a:p>
             <a:fld id="{1415355B-2634-4E66-91F0-41971C44CBA6}" type="datetimeFigureOut">
               <a:rPr lang="en-GB" smtClean="0"/>
-              <a:t>12/02/2025</a:t>
+              <a:t>13/02/2025</a:t>
             </a:fld>
             <a:endParaRPr lang="en-GB"/>
           </a:p>
@@ -2859,7 +2864,7 @@
           <a:p>
             <a:fld id="{1415355B-2634-4E66-91F0-41971C44CBA6}" type="datetimeFigureOut">
               <a:rPr lang="en-GB" smtClean="0"/>
-              <a:t>12/02/2025</a:t>
+              <a:t>13/02/2025</a:t>
             </a:fld>
             <a:endParaRPr lang="en-GB"/>
           </a:p>
@@ -3029,7 +3034,7 @@
           <a:p>
             <a:fld id="{1415355B-2634-4E66-91F0-41971C44CBA6}" type="datetimeFigureOut">
               <a:rPr lang="en-GB" smtClean="0"/>
-              <a:t>12/02/2025</a:t>
+              <a:t>13/02/2025</a:t>
             </a:fld>
             <a:endParaRPr lang="en-GB"/>
           </a:p>
@@ -3209,7 +3214,7 @@
           <a:p>
             <a:fld id="{1415355B-2634-4E66-91F0-41971C44CBA6}" type="datetimeFigureOut">
               <a:rPr lang="en-GB" smtClean="0"/>
-              <a:t>12/02/2025</a:t>
+              <a:t>13/02/2025</a:t>
             </a:fld>
             <a:endParaRPr lang="en-GB"/>
           </a:p>
@@ -3379,7 +3384,7 @@
           <a:p>
             <a:fld id="{1415355B-2634-4E66-91F0-41971C44CBA6}" type="datetimeFigureOut">
               <a:rPr lang="en-GB" smtClean="0"/>
-              <a:t>12/02/2025</a:t>
+              <a:t>13/02/2025</a:t>
             </a:fld>
             <a:endParaRPr lang="en-GB"/>
           </a:p>
@@ -3626,7 +3631,7 @@
           <a:p>
             <a:fld id="{1415355B-2634-4E66-91F0-41971C44CBA6}" type="datetimeFigureOut">
               <a:rPr lang="en-GB" smtClean="0"/>
-              <a:t>12/02/2025</a:t>
+              <a:t>13/02/2025</a:t>
             </a:fld>
             <a:endParaRPr lang="en-GB"/>
           </a:p>
@@ -3918,7 +3923,7 @@
           <a:p>
             <a:fld id="{1415355B-2634-4E66-91F0-41971C44CBA6}" type="datetimeFigureOut">
               <a:rPr lang="en-GB" smtClean="0"/>
-              <a:t>12/02/2025</a:t>
+              <a:t>13/02/2025</a:t>
             </a:fld>
             <a:endParaRPr lang="en-GB"/>
           </a:p>
@@ -4362,7 +4367,7 @@
           <a:p>
             <a:fld id="{1415355B-2634-4E66-91F0-41971C44CBA6}" type="datetimeFigureOut">
               <a:rPr lang="en-GB" smtClean="0"/>
-              <a:t>12/02/2025</a:t>
+              <a:t>13/02/2025</a:t>
             </a:fld>
             <a:endParaRPr lang="en-GB"/>
           </a:p>
@@ -4480,7 +4485,7 @@
           <a:p>
             <a:fld id="{1415355B-2634-4E66-91F0-41971C44CBA6}" type="datetimeFigureOut">
               <a:rPr lang="en-GB" smtClean="0"/>
-              <a:t>12/02/2025</a:t>
+              <a:t>13/02/2025</a:t>
             </a:fld>
             <a:endParaRPr lang="en-GB"/>
           </a:p>
@@ -4575,7 +4580,7 @@
           <a:p>
             <a:fld id="{1415355B-2634-4E66-91F0-41971C44CBA6}" type="datetimeFigureOut">
               <a:rPr lang="en-GB" smtClean="0"/>
-              <a:t>12/02/2025</a:t>
+              <a:t>13/02/2025</a:t>
             </a:fld>
             <a:endParaRPr lang="en-GB"/>
           </a:p>
@@ -4854,7 +4859,7 @@
           <a:p>
             <a:fld id="{1415355B-2634-4E66-91F0-41971C44CBA6}" type="datetimeFigureOut">
               <a:rPr lang="en-GB" smtClean="0"/>
-              <a:t>12/02/2025</a:t>
+              <a:t>13/02/2025</a:t>
             </a:fld>
             <a:endParaRPr lang="en-GB"/>
           </a:p>
@@ -5129,7 +5134,7 @@
           <a:p>
             <a:fld id="{1415355B-2634-4E66-91F0-41971C44CBA6}" type="datetimeFigureOut">
               <a:rPr lang="en-GB" smtClean="0"/>
-              <a:t>12/02/2025</a:t>
+              <a:t>13/02/2025</a:t>
             </a:fld>
             <a:endParaRPr lang="en-GB"/>
           </a:p>
@@ -5558,7 +5563,7 @@
           <a:p>
             <a:fld id="{1415355B-2634-4E66-91F0-41971C44CBA6}" type="datetimeFigureOut">
               <a:rPr lang="en-GB" smtClean="0"/>
-              <a:t>12/02/2025</a:t>
+              <a:t>13/02/2025</a:t>
             </a:fld>
             <a:endParaRPr lang="en-GB"/>
           </a:p>
@@ -6091,7 +6096,7 @@
           <p:cNvPr id="2" name="Title 1">
             <a:extLst>
               <a:ext uri="{FF2B5EF4-FFF2-40B4-BE49-F238E27FC236}">
-                <a16:creationId xmlns:a16="http://schemas.microsoft.com/office/drawing/2014/main" id="{47543072-5672-4121-36E8-38B13D2F535E}"/>
+                <a16:creationId xmlns:a16="http://schemas.microsoft.com/office/drawing/2014/main" id="{5FE8D1D3-0771-37CD-78D5-F856A524608C}"/>
               </a:ext>
             </a:extLst>
           </p:cNvPr>
@@ -6108,53 +6113,44 @@
           <a:lstStyle/>
           <a:p>
             <a:r>
-              <a:rPr lang="en-GB" dirty="0"/>
-              <a:t>Change</a:t>
-            </a:r>
-          </a:p>
-        </p:txBody>
-      </p:sp>
-      <p:pic>
-        <p:nvPicPr>
-          <p:cNvPr id="6" name="Content Placeholder 5" descr="A black and white flower&#10;&#10;Description automatically generated">
+              <a:rPr lang="en-GB" dirty="0" err="1"/>
+              <a:t>kjdfnskj</a:t>
+            </a:r>
+            <a:endParaRPr lang="en-GB" dirty="0"/>
+          </a:p>
+        </p:txBody>
+      </p:sp>
+      <p:sp>
+        <p:nvSpPr>
+          <p:cNvPr id="3" name="Picture Placeholder 2">
             <a:extLst>
               <a:ext uri="{FF2B5EF4-FFF2-40B4-BE49-F238E27FC236}">
-                <a16:creationId xmlns:a16="http://schemas.microsoft.com/office/drawing/2014/main" id="{7D296D57-B4C1-DCFF-C2CC-B35514ACBA03}"/>
+                <a16:creationId xmlns:a16="http://schemas.microsoft.com/office/drawing/2014/main" id="{99FD11E9-2ABA-95B7-30BC-3EE986624A29}"/>
               </a:ext>
             </a:extLst>
           </p:cNvPr>
-          <p:cNvPicPr>
-            <a:picLocks noGrp="1" noChangeAspect="1"/>
-          </p:cNvPicPr>
-          <p:nvPr>
-            <p:ph idx="1"/>
-          </p:nvPr>
-        </p:nvPicPr>
-        <p:blipFill>
-          <a:blip r:embed="rId2">
-            <a:extLst>
-              <a:ext uri="{28A0092B-C50C-407E-A947-70E740481C1C}">
-                <a14:useLocalDpi xmlns:a14="http://schemas.microsoft.com/office/drawing/2010/main" val="0"/>
-              </a:ext>
-            </a:extLst>
-          </a:blip>
-          <a:stretch>
-            <a:fillRect/>
-          </a:stretch>
-        </p:blipFill>
-        <p:spPr>
-          <a:xfrm>
-            <a:off x="5858669" y="1447800"/>
-            <a:ext cx="3047999" cy="4572000"/>
-          </a:xfrm>
-        </p:spPr>
-      </p:pic>
+          <p:cNvSpPr>
+            <a:spLocks noGrp="1"/>
+          </p:cNvSpPr>
+          <p:nvPr>
+            <p:ph type="pic" idx="1"/>
+          </p:nvPr>
+        </p:nvSpPr>
+        <p:spPr/>
+        <p:txBody>
+          <a:bodyPr/>
+          <a:lstStyle/>
+          <a:p>
+            <a:endParaRPr lang="en-GB"/>
+          </a:p>
+        </p:txBody>
+      </p:sp>
       <p:sp>
         <p:nvSpPr>
           <p:cNvPr id="4" name="Text Placeholder 3">
             <a:extLst>
               <a:ext uri="{FF2B5EF4-FFF2-40B4-BE49-F238E27FC236}">
-                <a16:creationId xmlns:a16="http://schemas.microsoft.com/office/drawing/2014/main" id="{1EA7F81D-8C76-D06C-D4AF-3987FA8CB416}"/>
+                <a16:creationId xmlns:a16="http://schemas.microsoft.com/office/drawing/2014/main" id="{B85FF16B-2F67-CF6E-37EF-72AD5B7356BA}"/>
               </a:ext>
             </a:extLst>
           </p:cNvPr>
@@ -6171,8 +6167,8 @@
           <a:lstStyle/>
           <a:p>
             <a:r>
-              <a:rPr lang="en-GB" dirty="0"/>
-              <a:t>Change please</a:t>
+              <a:rPr lang="en-GB"/>
+              <a:t>nmdsbjbfds</a:t>
             </a:r>
           </a:p>
         </p:txBody>
@@ -6180,7 +6176,7 @@
     </p:spTree>
     <p:extLst>
       <p:ext uri="{BB962C8B-B14F-4D97-AF65-F5344CB8AC3E}">
-        <p14:creationId xmlns:p14="http://schemas.microsoft.com/office/powerpoint/2010/main" val="2708749690"/>
+        <p14:creationId xmlns:p14="http://schemas.microsoft.com/office/powerpoint/2010/main" val="1634580685"/>
       </p:ext>
     </p:extLst>
   </p:cSld>

</xml_diff>